<commit_message>
self-->mirror, and anti-self-->inverse, adjust f scores
</commit_message>
<xml_diff>
--- a/figures/figure1_v2.pptx
+++ b/figures/figure1_v2.pptx
@@ -116,7 +116,7 @@
 <file path=ppt/revisionInfo.xml><?xml version="1.0" encoding="utf-8"?>
 <p1510:revInfo xmlns:a="http://schemas.openxmlformats.org/drawingml/2006/main" xmlns:r="http://schemas.openxmlformats.org/officeDocument/2006/relationships" xmlns:p1510="http://schemas.microsoft.com/office/powerpoint/2015/10/main">
   <p1510:revLst>
-    <p1510:client id="{AE23CADE-1E1E-4A42-BA53-D7F25A2D2BFC}" v="42" dt="2025-07-22T15:16:41.897"/>
+    <p1510:client id="{AE23CADE-1E1E-4A42-BA53-D7F25A2D2BFC}" v="46" dt="2025-08-06T13:42:17.131"/>
   </p1510:revLst>
 </p1510:revInfo>
 </file>
@@ -163,7 +163,7 @@
   <pc:docChgLst>
     <pc:chgData name="Castiello de Obeso, Santiago" userId="b4fc0b8e-1f0e-417a-8aad-015961d2398a" providerId="ADAL" clId="{AE23CADE-1E1E-4A42-BA53-D7F25A2D2BFC}"/>
     <pc:docChg chg="undo custSel addSld modSld">
-      <pc:chgData name="Castiello de Obeso, Santiago" userId="b4fc0b8e-1f0e-417a-8aad-015961d2398a" providerId="ADAL" clId="{AE23CADE-1E1E-4A42-BA53-D7F25A2D2BFC}" dt="2025-07-22T15:16:42.889" v="514" actId="21"/>
+      <pc:chgData name="Castiello de Obeso, Santiago" userId="b4fc0b8e-1f0e-417a-8aad-015961d2398a" providerId="ADAL" clId="{AE23CADE-1E1E-4A42-BA53-D7F25A2D2BFC}" dt="2025-08-06T13:42:18.041" v="539" actId="21"/>
       <pc:docMkLst>
         <pc:docMk/>
       </pc:docMkLst>
@@ -207,131 +207,11 @@
         </pc:spChg>
       </pc:sldChg>
       <pc:sldChg chg="addSp delSp modSp add mod">
-        <pc:chgData name="Castiello de Obeso, Santiago" userId="b4fc0b8e-1f0e-417a-8aad-015961d2398a" providerId="ADAL" clId="{AE23CADE-1E1E-4A42-BA53-D7F25A2D2BFC}" dt="2025-07-22T15:16:42.889" v="514" actId="21"/>
+        <pc:chgData name="Castiello de Obeso, Santiago" userId="b4fc0b8e-1f0e-417a-8aad-015961d2398a" providerId="ADAL" clId="{AE23CADE-1E1E-4A42-BA53-D7F25A2D2BFC}" dt="2025-08-06T13:42:18.041" v="539" actId="21"/>
         <pc:sldMkLst>
           <pc:docMk/>
           <pc:sldMk cId="1224849072" sldId="260"/>
         </pc:sldMkLst>
-        <pc:spChg chg="add del mod">
-          <ac:chgData name="Castiello de Obeso, Santiago" userId="b4fc0b8e-1f0e-417a-8aad-015961d2398a" providerId="ADAL" clId="{AE23CADE-1E1E-4A42-BA53-D7F25A2D2BFC}" dt="2025-07-21T14:23:02.902" v="88" actId="478"/>
-          <ac:spMkLst>
-            <pc:docMk/>
-            <pc:sldMk cId="1224849072" sldId="260"/>
-            <ac:spMk id="7" creationId="{3AB7672E-B99B-D06A-2FD0-7D400C1FC18E}"/>
-          </ac:spMkLst>
-        </pc:spChg>
-        <pc:spChg chg="mod">
-          <ac:chgData name="Castiello de Obeso, Santiago" userId="b4fc0b8e-1f0e-417a-8aad-015961d2398a" providerId="ADAL" clId="{AE23CADE-1E1E-4A42-BA53-D7F25A2D2BFC}" dt="2025-07-21T14:24:05.038" v="206" actId="1037"/>
-          <ac:spMkLst>
-            <pc:docMk/>
-            <pc:sldMk cId="1224849072" sldId="260"/>
-            <ac:spMk id="8" creationId="{AF1C2B13-2B18-95C4-097A-467D9C3E81CB}"/>
-          </ac:spMkLst>
-        </pc:spChg>
-        <pc:spChg chg="mod">
-          <ac:chgData name="Castiello de Obeso, Santiago" userId="b4fc0b8e-1f0e-417a-8aad-015961d2398a" providerId="ADAL" clId="{AE23CADE-1E1E-4A42-BA53-D7F25A2D2BFC}" dt="2025-07-21T14:24:05.038" v="206" actId="1037"/>
-          <ac:spMkLst>
-            <pc:docMk/>
-            <pc:sldMk cId="1224849072" sldId="260"/>
-            <ac:spMk id="9" creationId="{DE941780-EFE8-82D0-9165-22198C6BD77B}"/>
-          </ac:spMkLst>
-        </pc:spChg>
-        <pc:spChg chg="add del mod">
-          <ac:chgData name="Castiello de Obeso, Santiago" userId="b4fc0b8e-1f0e-417a-8aad-015961d2398a" providerId="ADAL" clId="{AE23CADE-1E1E-4A42-BA53-D7F25A2D2BFC}" dt="2025-07-21T14:24:11.075" v="207" actId="478"/>
-          <ac:spMkLst>
-            <pc:docMk/>
-            <pc:sldMk cId="1224849072" sldId="260"/>
-            <ac:spMk id="11" creationId="{AD6FAF45-27F2-5631-B757-42A3DFD9F6AF}"/>
-          </ac:spMkLst>
-        </pc:spChg>
-        <pc:spChg chg="del">
-          <ac:chgData name="Castiello de Obeso, Santiago" userId="b4fc0b8e-1f0e-417a-8aad-015961d2398a" providerId="ADAL" clId="{AE23CADE-1E1E-4A42-BA53-D7F25A2D2BFC}" dt="2025-07-21T14:24:11.075" v="207" actId="478"/>
-          <ac:spMkLst>
-            <pc:docMk/>
-            <pc:sldMk cId="1224849072" sldId="260"/>
-            <ac:spMk id="13" creationId="{2B28CC27-FDB5-526E-30F4-5174C5A4AD4E}"/>
-          </ac:spMkLst>
-        </pc:spChg>
-        <pc:spChg chg="del mod">
-          <ac:chgData name="Castiello de Obeso, Santiago" userId="b4fc0b8e-1f0e-417a-8aad-015961d2398a" providerId="ADAL" clId="{AE23CADE-1E1E-4A42-BA53-D7F25A2D2BFC}" dt="2025-07-21T14:24:11.075" v="207" actId="478"/>
-          <ac:spMkLst>
-            <pc:docMk/>
-            <pc:sldMk cId="1224849072" sldId="260"/>
-            <ac:spMk id="16" creationId="{C69CE303-7B89-03B5-67BC-EBB7B29F819C}"/>
-          </ac:spMkLst>
-        </pc:spChg>
-        <pc:spChg chg="mod">
-          <ac:chgData name="Castiello de Obeso, Santiago" userId="b4fc0b8e-1f0e-417a-8aad-015961d2398a" providerId="ADAL" clId="{AE23CADE-1E1E-4A42-BA53-D7F25A2D2BFC}" dt="2025-07-21T14:23:14.009" v="172" actId="1038"/>
-          <ac:spMkLst>
-            <pc:docMk/>
-            <pc:sldMk cId="1224849072" sldId="260"/>
-            <ac:spMk id="17" creationId="{3A6F2BC2-A3D0-B1D6-3264-8A37BA465837}"/>
-          </ac:spMkLst>
-        </pc:spChg>
-        <pc:spChg chg="add del mod">
-          <ac:chgData name="Castiello de Obeso, Santiago" userId="b4fc0b8e-1f0e-417a-8aad-015961d2398a" providerId="ADAL" clId="{AE23CADE-1E1E-4A42-BA53-D7F25A2D2BFC}" dt="2025-07-21T14:24:11.075" v="207" actId="478"/>
-          <ac:spMkLst>
-            <pc:docMk/>
-            <pc:sldMk cId="1224849072" sldId="260"/>
-            <ac:spMk id="35" creationId="{620C4C24-13A5-82DC-9DCF-11C63D072541}"/>
-          </ac:spMkLst>
-        </pc:spChg>
-        <pc:spChg chg="mod">
-          <ac:chgData name="Castiello de Obeso, Santiago" userId="b4fc0b8e-1f0e-417a-8aad-015961d2398a" providerId="ADAL" clId="{AE23CADE-1E1E-4A42-BA53-D7F25A2D2BFC}" dt="2025-07-21T14:23:14.009" v="172" actId="1038"/>
-          <ac:spMkLst>
-            <pc:docMk/>
-            <pc:sldMk cId="1224849072" sldId="260"/>
-            <ac:spMk id="36" creationId="{3C60F858-6BDB-D07A-122E-C460B2D82E10}"/>
-          </ac:spMkLst>
-        </pc:spChg>
-        <pc:spChg chg="mod">
-          <ac:chgData name="Castiello de Obeso, Santiago" userId="b4fc0b8e-1f0e-417a-8aad-015961d2398a" providerId="ADAL" clId="{AE23CADE-1E1E-4A42-BA53-D7F25A2D2BFC}" dt="2025-07-21T14:23:14.009" v="172" actId="1038"/>
-          <ac:spMkLst>
-            <pc:docMk/>
-            <pc:sldMk cId="1224849072" sldId="260"/>
-            <ac:spMk id="37" creationId="{71C71CA5-E450-941E-C91F-236CF5EC02B2}"/>
-          </ac:spMkLst>
-        </pc:spChg>
-        <pc:spChg chg="add mod">
-          <ac:chgData name="Castiello de Obeso, Santiago" userId="b4fc0b8e-1f0e-417a-8aad-015961d2398a" providerId="ADAL" clId="{AE23CADE-1E1E-4A42-BA53-D7F25A2D2BFC}" dt="2025-07-21T14:23:34.622" v="174" actId="1076"/>
-          <ac:spMkLst>
-            <pc:docMk/>
-            <pc:sldMk cId="1224849072" sldId="260"/>
-            <ac:spMk id="38" creationId="{F80EABE6-F1F7-6B4C-D3F4-3EE06A68F5F8}"/>
-          </ac:spMkLst>
-        </pc:spChg>
-        <pc:spChg chg="add del mod">
-          <ac:chgData name="Castiello de Obeso, Santiago" userId="b4fc0b8e-1f0e-417a-8aad-015961d2398a" providerId="ADAL" clId="{AE23CADE-1E1E-4A42-BA53-D7F25A2D2BFC}" dt="2025-07-21T14:24:11.075" v="207" actId="478"/>
-          <ac:spMkLst>
-            <pc:docMk/>
-            <pc:sldMk cId="1224849072" sldId="260"/>
-            <ac:spMk id="39" creationId="{BE9AA609-1196-8903-B858-A03311DE2750}"/>
-          </ac:spMkLst>
-        </pc:spChg>
-        <pc:spChg chg="del mod">
-          <ac:chgData name="Castiello de Obeso, Santiago" userId="b4fc0b8e-1f0e-417a-8aad-015961d2398a" providerId="ADAL" clId="{AE23CADE-1E1E-4A42-BA53-D7F25A2D2BFC}" dt="2025-07-21T14:24:11.075" v="207" actId="478"/>
-          <ac:spMkLst>
-            <pc:docMk/>
-            <pc:sldMk cId="1224849072" sldId="260"/>
-            <ac:spMk id="40" creationId="{B7E6F755-FFCB-D665-994F-6D7555879C99}"/>
-          </ac:spMkLst>
-        </pc:spChg>
-        <pc:spChg chg="del mod">
-          <ac:chgData name="Castiello de Obeso, Santiago" userId="b4fc0b8e-1f0e-417a-8aad-015961d2398a" providerId="ADAL" clId="{AE23CADE-1E1E-4A42-BA53-D7F25A2D2BFC}" dt="2025-07-21T14:24:11.075" v="207" actId="478"/>
-          <ac:spMkLst>
-            <pc:docMk/>
-            <pc:sldMk cId="1224849072" sldId="260"/>
-            <ac:spMk id="41" creationId="{057FF3CC-0E52-73D5-5F46-00E9E27B94FA}"/>
-          </ac:spMkLst>
-        </pc:spChg>
-        <pc:spChg chg="add del mod">
-          <ac:chgData name="Castiello de Obeso, Santiago" userId="b4fc0b8e-1f0e-417a-8aad-015961d2398a" providerId="ADAL" clId="{AE23CADE-1E1E-4A42-BA53-D7F25A2D2BFC}" dt="2025-07-21T14:24:11.075" v="207" actId="478"/>
-          <ac:spMkLst>
-            <pc:docMk/>
-            <pc:sldMk cId="1224849072" sldId="260"/>
-            <ac:spMk id="42" creationId="{E87A24EB-4D01-EE5B-3D3E-B20A7F1BA65D}"/>
-          </ac:spMkLst>
-        </pc:spChg>
         <pc:spChg chg="mod">
           <ac:chgData name="Castiello de Obeso, Santiago" userId="b4fc0b8e-1f0e-417a-8aad-015961d2398a" providerId="ADAL" clId="{AE23CADE-1E1E-4A42-BA53-D7F25A2D2BFC}" dt="2025-07-21T14:31:50.094" v="447" actId="1076"/>
           <ac:spMkLst>
@@ -346,78 +226,6 @@
             <pc:docMk/>
             <pc:sldMk cId="1224849072" sldId="260"/>
             <ac:spMk id="44" creationId="{803C3CC7-A45D-E977-777A-E38D05787AEF}"/>
-          </ac:spMkLst>
-        </pc:spChg>
-        <pc:spChg chg="mod">
-          <ac:chgData name="Castiello de Obeso, Santiago" userId="b4fc0b8e-1f0e-417a-8aad-015961d2398a" providerId="ADAL" clId="{AE23CADE-1E1E-4A42-BA53-D7F25A2D2BFC}" dt="2025-07-21T14:23:31.459" v="173"/>
-          <ac:spMkLst>
-            <pc:docMk/>
-            <pc:sldMk cId="1224849072" sldId="260"/>
-            <ac:spMk id="51" creationId="{76BEA1FA-B9D2-BADB-FF49-080E1CCA1749}"/>
-          </ac:spMkLst>
-        </pc:spChg>
-        <pc:spChg chg="mod">
-          <ac:chgData name="Castiello de Obeso, Santiago" userId="b4fc0b8e-1f0e-417a-8aad-015961d2398a" providerId="ADAL" clId="{AE23CADE-1E1E-4A42-BA53-D7F25A2D2BFC}" dt="2025-07-21T14:23:31.459" v="173"/>
-          <ac:spMkLst>
-            <pc:docMk/>
-            <pc:sldMk cId="1224849072" sldId="260"/>
-            <ac:spMk id="52" creationId="{B1F3C93E-6223-B974-25FD-7BD917B04D05}"/>
-          </ac:spMkLst>
-        </pc:spChg>
-        <pc:spChg chg="add del mod">
-          <ac:chgData name="Castiello de Obeso, Santiago" userId="b4fc0b8e-1f0e-417a-8aad-015961d2398a" providerId="ADAL" clId="{AE23CADE-1E1E-4A42-BA53-D7F25A2D2BFC}" dt="2025-07-21T14:24:11.075" v="207" actId="478"/>
-          <ac:spMkLst>
-            <pc:docMk/>
-            <pc:sldMk cId="1224849072" sldId="260"/>
-            <ac:spMk id="56" creationId="{5CEEAE1E-DED6-7EB2-99F1-2CF4B49A4FB8}"/>
-          </ac:spMkLst>
-        </pc:spChg>
-        <pc:spChg chg="add mod">
-          <ac:chgData name="Castiello de Obeso, Santiago" userId="b4fc0b8e-1f0e-417a-8aad-015961d2398a" providerId="ADAL" clId="{AE23CADE-1E1E-4A42-BA53-D7F25A2D2BFC}" dt="2025-07-21T14:23:34.622" v="174" actId="1076"/>
-          <ac:spMkLst>
-            <pc:docMk/>
-            <pc:sldMk cId="1224849072" sldId="260"/>
-            <ac:spMk id="57" creationId="{73039550-201E-294F-F3EB-185980961143}"/>
-          </ac:spMkLst>
-        </pc:spChg>
-        <pc:spChg chg="add mod">
-          <ac:chgData name="Castiello de Obeso, Santiago" userId="b4fc0b8e-1f0e-417a-8aad-015961d2398a" providerId="ADAL" clId="{AE23CADE-1E1E-4A42-BA53-D7F25A2D2BFC}" dt="2025-07-21T14:24:18.826" v="208"/>
-          <ac:spMkLst>
-            <pc:docMk/>
-            <pc:sldMk cId="1224849072" sldId="260"/>
-            <ac:spMk id="69" creationId="{378BF6BE-E65C-FA07-FD35-58451CD1A08A}"/>
-          </ac:spMkLst>
-        </pc:spChg>
-        <pc:spChg chg="add mod">
-          <ac:chgData name="Castiello de Obeso, Santiago" userId="b4fc0b8e-1f0e-417a-8aad-015961d2398a" providerId="ADAL" clId="{AE23CADE-1E1E-4A42-BA53-D7F25A2D2BFC}" dt="2025-07-21T14:24:18.826" v="208"/>
-          <ac:spMkLst>
-            <pc:docMk/>
-            <pc:sldMk cId="1224849072" sldId="260"/>
-            <ac:spMk id="70" creationId="{2A8A424D-00CB-CB2D-011C-AF6978C990AA}"/>
-          </ac:spMkLst>
-        </pc:spChg>
-        <pc:spChg chg="del mod">
-          <ac:chgData name="Castiello de Obeso, Santiago" userId="b4fc0b8e-1f0e-417a-8aad-015961d2398a" providerId="ADAL" clId="{AE23CADE-1E1E-4A42-BA53-D7F25A2D2BFC}" dt="2025-07-21T14:23:01.320" v="87" actId="478"/>
-          <ac:spMkLst>
-            <pc:docMk/>
-            <pc:sldMk cId="1224849072" sldId="260"/>
-            <ac:spMk id="71" creationId="{D8A928C8-55A1-F7CC-ED65-3D30C994F5EE}"/>
-          </ac:spMkLst>
-        </pc:spChg>
-        <pc:spChg chg="add mod">
-          <ac:chgData name="Castiello de Obeso, Santiago" userId="b4fc0b8e-1f0e-417a-8aad-015961d2398a" providerId="ADAL" clId="{AE23CADE-1E1E-4A42-BA53-D7F25A2D2BFC}" dt="2025-07-21T14:24:18.826" v="208"/>
-          <ac:spMkLst>
-            <pc:docMk/>
-            <pc:sldMk cId="1224849072" sldId="260"/>
-            <ac:spMk id="72" creationId="{37F07433-981C-F67C-B358-2FA7EA13843B}"/>
-          </ac:spMkLst>
-        </pc:spChg>
-        <pc:spChg chg="add mod">
-          <ac:chgData name="Castiello de Obeso, Santiago" userId="b4fc0b8e-1f0e-417a-8aad-015961d2398a" providerId="ADAL" clId="{AE23CADE-1E1E-4A42-BA53-D7F25A2D2BFC}" dt="2025-07-21T14:24:18.826" v="208"/>
-          <ac:spMkLst>
-            <pc:docMk/>
-            <pc:sldMk cId="1224849072" sldId="260"/>
-            <ac:spMk id="73" creationId="{C502B497-694A-C687-C70C-AB296D17CAF8}"/>
           </ac:spMkLst>
         </pc:spChg>
         <pc:spChg chg="mod">
@@ -452,46 +260,6 @@
             <ac:spMk id="79" creationId="{A78486C1-0FD8-1E1A-ED92-F5CA34B8399D}"/>
           </ac:spMkLst>
         </pc:spChg>
-        <pc:spChg chg="add del mod">
-          <ac:chgData name="Castiello de Obeso, Santiago" userId="b4fc0b8e-1f0e-417a-8aad-015961d2398a" providerId="ADAL" clId="{AE23CADE-1E1E-4A42-BA53-D7F25A2D2BFC}" dt="2025-07-21T14:27:37.226" v="359" actId="478"/>
-          <ac:spMkLst>
-            <pc:docMk/>
-            <pc:sldMk cId="1224849072" sldId="260"/>
-            <ac:spMk id="80" creationId="{10EF9D85-EA33-6095-6495-301E808F1790}"/>
-          </ac:spMkLst>
-        </pc:spChg>
-        <pc:spChg chg="add del mod">
-          <ac:chgData name="Castiello de Obeso, Santiago" userId="b4fc0b8e-1f0e-417a-8aad-015961d2398a" providerId="ADAL" clId="{AE23CADE-1E1E-4A42-BA53-D7F25A2D2BFC}" dt="2025-07-21T14:28:01.965" v="365" actId="478"/>
-          <ac:spMkLst>
-            <pc:docMk/>
-            <pc:sldMk cId="1224849072" sldId="260"/>
-            <ac:spMk id="81" creationId="{A317806F-EC21-E57B-AF83-E72FB2FCF6AB}"/>
-          </ac:spMkLst>
-        </pc:spChg>
-        <pc:spChg chg="add del mod">
-          <ac:chgData name="Castiello de Obeso, Santiago" userId="b4fc0b8e-1f0e-417a-8aad-015961d2398a" providerId="ADAL" clId="{AE23CADE-1E1E-4A42-BA53-D7F25A2D2BFC}" dt="2025-07-21T14:28:01.965" v="365" actId="478"/>
-          <ac:spMkLst>
-            <pc:docMk/>
-            <pc:sldMk cId="1224849072" sldId="260"/>
-            <ac:spMk id="82" creationId="{7EA0A67F-1FFE-B275-7522-364B3B96FA82}"/>
-          </ac:spMkLst>
-        </pc:spChg>
-        <pc:spChg chg="add del mod">
-          <ac:chgData name="Castiello de Obeso, Santiago" userId="b4fc0b8e-1f0e-417a-8aad-015961d2398a" providerId="ADAL" clId="{AE23CADE-1E1E-4A42-BA53-D7F25A2D2BFC}" dt="2025-07-21T14:28:01.965" v="365" actId="478"/>
-          <ac:spMkLst>
-            <pc:docMk/>
-            <pc:sldMk cId="1224849072" sldId="260"/>
-            <ac:spMk id="83" creationId="{1BF60229-D35E-A4E3-018C-5CD23D8D9296}"/>
-          </ac:spMkLst>
-        </pc:spChg>
-        <pc:spChg chg="add del mod">
-          <ac:chgData name="Castiello de Obeso, Santiago" userId="b4fc0b8e-1f0e-417a-8aad-015961d2398a" providerId="ADAL" clId="{AE23CADE-1E1E-4A42-BA53-D7F25A2D2BFC}" dt="2025-07-21T14:28:01.965" v="365" actId="478"/>
-          <ac:spMkLst>
-            <pc:docMk/>
-            <pc:sldMk cId="1224849072" sldId="260"/>
-            <ac:spMk id="84" creationId="{D69D4A21-761D-A4AA-906C-9BF1021956F1}"/>
-          </ac:spMkLst>
-        </pc:spChg>
         <pc:spChg chg="add mod">
           <ac:chgData name="Castiello de Obeso, Santiago" userId="b4fc0b8e-1f0e-417a-8aad-015961d2398a" providerId="ADAL" clId="{AE23CADE-1E1E-4A42-BA53-D7F25A2D2BFC}" dt="2025-07-22T15:16:15.395" v="511" actId="1076"/>
           <ac:spMkLst>
@@ -522,150 +290,6 @@
             <pc:docMk/>
             <pc:sldMk cId="1224849072" sldId="260"/>
             <ac:spMk id="93" creationId="{B1821D25-1C37-5CA4-1AF3-E772D78327E5}"/>
-          </ac:spMkLst>
-        </pc:spChg>
-        <pc:spChg chg="del">
-          <ac:chgData name="Castiello de Obeso, Santiago" userId="b4fc0b8e-1f0e-417a-8aad-015961d2398a" providerId="ADAL" clId="{AE23CADE-1E1E-4A42-BA53-D7F25A2D2BFC}" dt="2025-07-21T14:25:24.573" v="227" actId="478"/>
-          <ac:spMkLst>
-            <pc:docMk/>
-            <pc:sldMk cId="1224849072" sldId="260"/>
-            <ac:spMk id="101" creationId="{5C56A8DF-18C1-125D-E0FB-8B91B2A76B95}"/>
-          </ac:spMkLst>
-        </pc:spChg>
-        <pc:spChg chg="add del">
-          <ac:chgData name="Castiello de Obeso, Santiago" userId="b4fc0b8e-1f0e-417a-8aad-015961d2398a" providerId="ADAL" clId="{AE23CADE-1E1E-4A42-BA53-D7F25A2D2BFC}" dt="2025-07-21T14:28:01.965" v="365" actId="478"/>
-          <ac:spMkLst>
-            <pc:docMk/>
-            <pc:sldMk cId="1224849072" sldId="260"/>
-            <ac:spMk id="108" creationId="{42F216C1-2F16-99B6-5AFA-5B32B31B1183}"/>
-          </ac:spMkLst>
-        </pc:spChg>
-        <pc:spChg chg="add del">
-          <ac:chgData name="Castiello de Obeso, Santiago" userId="b4fc0b8e-1f0e-417a-8aad-015961d2398a" providerId="ADAL" clId="{AE23CADE-1E1E-4A42-BA53-D7F25A2D2BFC}" dt="2025-07-21T14:28:01.965" v="365" actId="478"/>
-          <ac:spMkLst>
-            <pc:docMk/>
-            <pc:sldMk cId="1224849072" sldId="260"/>
-            <ac:spMk id="109" creationId="{7E39A3BC-2C99-26C8-AC9B-3D8A950A2450}"/>
-          </ac:spMkLst>
-        </pc:spChg>
-        <pc:spChg chg="add del mod">
-          <ac:chgData name="Castiello de Obeso, Santiago" userId="b4fc0b8e-1f0e-417a-8aad-015961d2398a" providerId="ADAL" clId="{AE23CADE-1E1E-4A42-BA53-D7F25A2D2BFC}" dt="2025-07-21T14:27:37.226" v="359" actId="478"/>
-          <ac:spMkLst>
-            <pc:docMk/>
-            <pc:sldMk cId="1224849072" sldId="260"/>
-            <ac:spMk id="118" creationId="{D5EB83FD-44AE-1DBA-FCA8-180D8031122B}"/>
-          </ac:spMkLst>
-        </pc:spChg>
-        <pc:spChg chg="add del mod">
-          <ac:chgData name="Castiello de Obeso, Santiago" userId="b4fc0b8e-1f0e-417a-8aad-015961d2398a" providerId="ADAL" clId="{AE23CADE-1E1E-4A42-BA53-D7F25A2D2BFC}" dt="2025-07-21T14:28:01.965" v="365" actId="478"/>
-          <ac:spMkLst>
-            <pc:docMk/>
-            <pc:sldMk cId="1224849072" sldId="260"/>
-            <ac:spMk id="120" creationId="{BF44565A-62CF-0913-A9BD-FEDC1B995B63}"/>
-          </ac:spMkLst>
-        </pc:spChg>
-        <pc:spChg chg="add del mod">
-          <ac:chgData name="Castiello de Obeso, Santiago" userId="b4fc0b8e-1f0e-417a-8aad-015961d2398a" providerId="ADAL" clId="{AE23CADE-1E1E-4A42-BA53-D7F25A2D2BFC}" dt="2025-07-21T14:28:01.965" v="365" actId="478"/>
-          <ac:spMkLst>
-            <pc:docMk/>
-            <pc:sldMk cId="1224849072" sldId="260"/>
-            <ac:spMk id="121" creationId="{FB617A1A-4AB2-2CF7-87DC-B6A797D9D8D1}"/>
-          </ac:spMkLst>
-        </pc:spChg>
-        <pc:spChg chg="add del mod">
-          <ac:chgData name="Castiello de Obeso, Santiago" userId="b4fc0b8e-1f0e-417a-8aad-015961d2398a" providerId="ADAL" clId="{AE23CADE-1E1E-4A42-BA53-D7F25A2D2BFC}" dt="2025-07-21T14:28:01.965" v="365" actId="478"/>
-          <ac:spMkLst>
-            <pc:docMk/>
-            <pc:sldMk cId="1224849072" sldId="260"/>
-            <ac:spMk id="122" creationId="{370CF081-BD84-17A6-4197-B1306B8F397F}"/>
-          </ac:spMkLst>
-        </pc:spChg>
-        <pc:spChg chg="add del mod">
-          <ac:chgData name="Castiello de Obeso, Santiago" userId="b4fc0b8e-1f0e-417a-8aad-015961d2398a" providerId="ADAL" clId="{AE23CADE-1E1E-4A42-BA53-D7F25A2D2BFC}" dt="2025-07-21T14:28:01.965" v="365" actId="478"/>
-          <ac:spMkLst>
-            <pc:docMk/>
-            <pc:sldMk cId="1224849072" sldId="260"/>
-            <ac:spMk id="123" creationId="{8A6FC37D-EF9C-1349-2008-071C93D2C348}"/>
-          </ac:spMkLst>
-        </pc:spChg>
-        <pc:spChg chg="mod">
-          <ac:chgData name="Castiello de Obeso, Santiago" userId="b4fc0b8e-1f0e-417a-8aad-015961d2398a" providerId="ADAL" clId="{AE23CADE-1E1E-4A42-BA53-D7F25A2D2BFC}" dt="2025-07-21T14:23:14.009" v="172" actId="1038"/>
-          <ac:spMkLst>
-            <pc:docMk/>
-            <pc:sldMk cId="1224849072" sldId="260"/>
-            <ac:spMk id="127" creationId="{B8127DC9-D803-506A-23B2-46D19A47ED93}"/>
-          </ac:spMkLst>
-        </pc:spChg>
-        <pc:spChg chg="add mod">
-          <ac:chgData name="Castiello de Obeso, Santiago" userId="b4fc0b8e-1f0e-417a-8aad-015961d2398a" providerId="ADAL" clId="{AE23CADE-1E1E-4A42-BA53-D7F25A2D2BFC}" dt="2025-07-21T14:27:54.166" v="362"/>
-          <ac:spMkLst>
-            <pc:docMk/>
-            <pc:sldMk cId="1224849072" sldId="260"/>
-            <ac:spMk id="150" creationId="{44162677-9A95-5D62-139C-2550BD413BCD}"/>
-          </ac:spMkLst>
-        </pc:spChg>
-        <pc:spChg chg="add mod">
-          <ac:chgData name="Castiello de Obeso, Santiago" userId="b4fc0b8e-1f0e-417a-8aad-015961d2398a" providerId="ADAL" clId="{AE23CADE-1E1E-4A42-BA53-D7F25A2D2BFC}" dt="2025-07-21T14:27:54.166" v="362"/>
-          <ac:spMkLst>
-            <pc:docMk/>
-            <pc:sldMk cId="1224849072" sldId="260"/>
-            <ac:spMk id="152" creationId="{2640FB0C-ACB8-3353-B65B-CCEDB5EA860D}"/>
-          </ac:spMkLst>
-        </pc:spChg>
-        <pc:spChg chg="add mod">
-          <ac:chgData name="Castiello de Obeso, Santiago" userId="b4fc0b8e-1f0e-417a-8aad-015961d2398a" providerId="ADAL" clId="{AE23CADE-1E1E-4A42-BA53-D7F25A2D2BFC}" dt="2025-07-21T14:27:54.166" v="362"/>
-          <ac:spMkLst>
-            <pc:docMk/>
-            <pc:sldMk cId="1224849072" sldId="260"/>
-            <ac:spMk id="153" creationId="{A0C245CE-F9B3-FFCD-815B-9106D025FC99}"/>
-          </ac:spMkLst>
-        </pc:spChg>
-        <pc:spChg chg="add mod">
-          <ac:chgData name="Castiello de Obeso, Santiago" userId="b4fc0b8e-1f0e-417a-8aad-015961d2398a" providerId="ADAL" clId="{AE23CADE-1E1E-4A42-BA53-D7F25A2D2BFC}" dt="2025-07-21T14:27:54.166" v="362"/>
-          <ac:spMkLst>
-            <pc:docMk/>
-            <pc:sldMk cId="1224849072" sldId="260"/>
-            <ac:spMk id="154" creationId="{06385083-1E9B-BCFB-AA0B-F296B66AC25D}"/>
-          </ac:spMkLst>
-        </pc:spChg>
-        <pc:spChg chg="add mod">
-          <ac:chgData name="Castiello de Obeso, Santiago" userId="b4fc0b8e-1f0e-417a-8aad-015961d2398a" providerId="ADAL" clId="{AE23CADE-1E1E-4A42-BA53-D7F25A2D2BFC}" dt="2025-07-21T14:27:54.166" v="362"/>
-          <ac:spMkLst>
-            <pc:docMk/>
-            <pc:sldMk cId="1224849072" sldId="260"/>
-            <ac:spMk id="155" creationId="{EC958546-C746-62EC-754D-A9E10626F8E6}"/>
-          </ac:spMkLst>
-        </pc:spChg>
-        <pc:spChg chg="add mod">
-          <ac:chgData name="Castiello de Obeso, Santiago" userId="b4fc0b8e-1f0e-417a-8aad-015961d2398a" providerId="ADAL" clId="{AE23CADE-1E1E-4A42-BA53-D7F25A2D2BFC}" dt="2025-07-21T14:27:54.166" v="362"/>
-          <ac:spMkLst>
-            <pc:docMk/>
-            <pc:sldMk cId="1224849072" sldId="260"/>
-            <ac:spMk id="157" creationId="{D9D4116C-F04B-7683-050A-216DA2958E86}"/>
-          </ac:spMkLst>
-        </pc:spChg>
-        <pc:spChg chg="del mod">
-          <ac:chgData name="Castiello de Obeso, Santiago" userId="b4fc0b8e-1f0e-417a-8aad-015961d2398a" providerId="ADAL" clId="{AE23CADE-1E1E-4A42-BA53-D7F25A2D2BFC}" dt="2025-07-21T14:24:11.075" v="207" actId="478"/>
-          <ac:spMkLst>
-            <pc:docMk/>
-            <pc:sldMk cId="1224849072" sldId="260"/>
-            <ac:spMk id="158" creationId="{5137C6D2-22A8-7494-3389-E6D019FCE503}"/>
-          </ac:spMkLst>
-        </pc:spChg>
-        <pc:spChg chg="mod">
-          <ac:chgData name="Castiello de Obeso, Santiago" userId="b4fc0b8e-1f0e-417a-8aad-015961d2398a" providerId="ADAL" clId="{AE23CADE-1E1E-4A42-BA53-D7F25A2D2BFC}" dt="2025-07-21T14:27:54.166" v="362"/>
-          <ac:spMkLst>
-            <pc:docMk/>
-            <pc:sldMk cId="1224849072" sldId="260"/>
-            <ac:spMk id="163" creationId="{0959F600-BCDB-3B40-B3C1-D86553F4DDCF}"/>
-          </ac:spMkLst>
-        </pc:spChg>
-        <pc:spChg chg="mod">
-          <ac:chgData name="Castiello de Obeso, Santiago" userId="b4fc0b8e-1f0e-417a-8aad-015961d2398a" providerId="ADAL" clId="{AE23CADE-1E1E-4A42-BA53-D7F25A2D2BFC}" dt="2025-07-21T14:27:54.166" v="362"/>
-          <ac:spMkLst>
-            <pc:docMk/>
-            <pc:sldMk cId="1224849072" sldId="260"/>
-            <ac:spMk id="164" creationId="{A1213F97-DACD-F31C-7909-C9A58ADE2DFF}"/>
           </ac:spMkLst>
         </pc:spChg>
         <pc:spChg chg="add mod">
@@ -733,7 +357,7 @@
           </ac:spMkLst>
         </pc:spChg>
         <pc:spChg chg="add mod">
-          <ac:chgData name="Castiello de Obeso, Santiago" userId="b4fc0b8e-1f0e-417a-8aad-015961d2398a" providerId="ADAL" clId="{AE23CADE-1E1E-4A42-BA53-D7F25A2D2BFC}" dt="2025-07-22T15:16:08.188" v="510" actId="1038"/>
+          <ac:chgData name="Castiello de Obeso, Santiago" userId="b4fc0b8e-1f0e-417a-8aad-015961d2398a" providerId="ADAL" clId="{AE23CADE-1E1E-4A42-BA53-D7F25A2D2BFC}" dt="2025-08-06T13:42:03.716" v="528" actId="20577"/>
           <ac:spMkLst>
             <pc:docMk/>
             <pc:sldMk cId="1224849072" sldId="260"/>
@@ -741,7 +365,7 @@
           </ac:spMkLst>
         </pc:spChg>
         <pc:spChg chg="add mod">
-          <ac:chgData name="Castiello de Obeso, Santiago" userId="b4fc0b8e-1f0e-417a-8aad-015961d2398a" providerId="ADAL" clId="{AE23CADE-1E1E-4A42-BA53-D7F25A2D2BFC}" dt="2025-07-22T15:16:08.188" v="510" actId="1038"/>
+          <ac:chgData name="Castiello de Obeso, Santiago" userId="b4fc0b8e-1f0e-417a-8aad-015961d2398a" providerId="ADAL" clId="{AE23CADE-1E1E-4A42-BA53-D7F25A2D2BFC}" dt="2025-08-06T13:42:07.596" v="536" actId="20577"/>
           <ac:spMkLst>
             <pc:docMk/>
             <pc:sldMk cId="1224849072" sldId="260"/>
@@ -765,7 +389,7 @@
           </ac:spMkLst>
         </pc:spChg>
         <pc:spChg chg="add mod">
-          <ac:chgData name="Castiello de Obeso, Santiago" userId="b4fc0b8e-1f0e-417a-8aad-015961d2398a" providerId="ADAL" clId="{AE23CADE-1E1E-4A42-BA53-D7F25A2D2BFC}" dt="2025-07-22T15:16:08.188" v="510" actId="1038"/>
+          <ac:chgData name="Castiello de Obeso, Santiago" userId="b4fc0b8e-1f0e-417a-8aad-015961d2398a" providerId="ADAL" clId="{AE23CADE-1E1E-4A42-BA53-D7F25A2D2BFC}" dt="2025-08-06T13:42:05.591" v="529"/>
           <ac:spMkLst>
             <pc:docMk/>
             <pc:sldMk cId="1224849072" sldId="260"/>
@@ -773,7 +397,7 @@
           </ac:spMkLst>
         </pc:spChg>
         <pc:spChg chg="add mod">
-          <ac:chgData name="Castiello de Obeso, Santiago" userId="b4fc0b8e-1f0e-417a-8aad-015961d2398a" providerId="ADAL" clId="{AE23CADE-1E1E-4A42-BA53-D7F25A2D2BFC}" dt="2025-07-22T15:16:08.188" v="510" actId="1038"/>
+          <ac:chgData name="Castiello de Obeso, Santiago" userId="b4fc0b8e-1f0e-417a-8aad-015961d2398a" providerId="ADAL" clId="{AE23CADE-1E1E-4A42-BA53-D7F25A2D2BFC}" dt="2025-08-06T13:42:10.485" v="537"/>
           <ac:spMkLst>
             <pc:docMk/>
             <pc:sldMk cId="1224849072" sldId="260"/>
@@ -813,7 +437,7 @@
           </ac:spMkLst>
         </pc:spChg>
         <pc:spChg chg="add mod">
-          <ac:chgData name="Castiello de Obeso, Santiago" userId="b4fc0b8e-1f0e-417a-8aad-015961d2398a" providerId="ADAL" clId="{AE23CADE-1E1E-4A42-BA53-D7F25A2D2BFC}" dt="2025-07-22T15:16:28.763" v="512" actId="1076"/>
+          <ac:chgData name="Castiello de Obeso, Santiago" userId="b4fc0b8e-1f0e-417a-8aad-015961d2398a" providerId="ADAL" clId="{AE23CADE-1E1E-4A42-BA53-D7F25A2D2BFC}" dt="2025-07-29T14:54:13.137" v="520" actId="6549"/>
           <ac:spMkLst>
             <pc:docMk/>
             <pc:sldMk cId="1224849072" sldId="260"/>
@@ -828,36 +452,12 @@
             <ac:spMk id="214" creationId="{54AF0165-F1BE-00D7-37C2-FA20BA0020E5}"/>
           </ac:spMkLst>
         </pc:spChg>
-        <pc:grpChg chg="add mod">
-          <ac:chgData name="Castiello de Obeso, Santiago" userId="b4fc0b8e-1f0e-417a-8aad-015961d2398a" providerId="ADAL" clId="{AE23CADE-1E1E-4A42-BA53-D7F25A2D2BFC}" dt="2025-07-21T14:23:34.622" v="174" actId="1076"/>
-          <ac:grpSpMkLst>
-            <pc:docMk/>
-            <pc:sldMk cId="1224849072" sldId="260"/>
-            <ac:grpSpMk id="49" creationId="{506F09A6-28D9-871A-DCE5-866F4AFE150D}"/>
-          </ac:grpSpMkLst>
-        </pc:grpChg>
-        <pc:grpChg chg="mod">
-          <ac:chgData name="Castiello de Obeso, Santiago" userId="b4fc0b8e-1f0e-417a-8aad-015961d2398a" providerId="ADAL" clId="{AE23CADE-1E1E-4A42-BA53-D7F25A2D2BFC}" dt="2025-07-21T14:23:14.009" v="172" actId="1038"/>
-          <ac:grpSpMkLst>
-            <pc:docMk/>
-            <pc:sldMk cId="1224849072" sldId="260"/>
-            <ac:grpSpMk id="74" creationId="{B142F5EE-6E4B-7D80-0308-7659754E6423}"/>
-          </ac:grpSpMkLst>
-        </pc:grpChg>
         <pc:grpChg chg="mod">
           <ac:chgData name="Castiello de Obeso, Santiago" userId="b4fc0b8e-1f0e-417a-8aad-015961d2398a" providerId="ADAL" clId="{AE23CADE-1E1E-4A42-BA53-D7F25A2D2BFC}" dt="2025-07-22T15:16:15.395" v="511" actId="1076"/>
           <ac:grpSpMkLst>
             <pc:docMk/>
             <pc:sldMk cId="1224849072" sldId="260"/>
             <ac:grpSpMk id="91" creationId="{D3F83303-FD52-7983-44E1-EC7C54DD8BFB}"/>
-          </ac:grpSpMkLst>
-        </pc:grpChg>
-        <pc:grpChg chg="add mod">
-          <ac:chgData name="Castiello de Obeso, Santiago" userId="b4fc0b8e-1f0e-417a-8aad-015961d2398a" providerId="ADAL" clId="{AE23CADE-1E1E-4A42-BA53-D7F25A2D2BFC}" dt="2025-07-21T14:27:54.166" v="362"/>
-          <ac:grpSpMkLst>
-            <pc:docMk/>
-            <pc:sldMk cId="1224849072" sldId="260"/>
-            <ac:grpSpMk id="162" creationId="{789AB57C-A38E-7980-0773-7064A1EAB954}"/>
           </ac:grpSpMkLst>
         </pc:grpChg>
         <pc:grpChg chg="add mod">
@@ -877,101 +477,13 @@
           </ac:grpSpMkLst>
         </pc:grpChg>
         <pc:picChg chg="add del">
-          <ac:chgData name="Castiello de Obeso, Santiago" userId="b4fc0b8e-1f0e-417a-8aad-015961d2398a" providerId="ADAL" clId="{AE23CADE-1E1E-4A42-BA53-D7F25A2D2BFC}" dt="2025-07-22T15:16:42.889" v="514" actId="21"/>
+          <ac:chgData name="Castiello de Obeso, Santiago" userId="b4fc0b8e-1f0e-417a-8aad-015961d2398a" providerId="ADAL" clId="{AE23CADE-1E1E-4A42-BA53-D7F25A2D2BFC}" dt="2025-08-06T13:42:18.041" v="539" actId="21"/>
           <ac:picMkLst>
             <pc:docMk/>
             <pc:sldMk cId="1224849072" sldId="260"/>
-            <ac:picMk id="216" creationId="{198D9D5C-3F2C-CC10-04BF-B64D4BD8DA64}"/>
+            <ac:picMk id="2" creationId="{1FD8677B-3B0A-5C84-89F4-0833EE190BD3}"/>
           </ac:picMkLst>
         </pc:picChg>
-        <pc:cxnChg chg="del mod">
-          <ac:chgData name="Castiello de Obeso, Santiago" userId="b4fc0b8e-1f0e-417a-8aad-015961d2398a" providerId="ADAL" clId="{AE23CADE-1E1E-4A42-BA53-D7F25A2D2BFC}" dt="2025-07-21T14:23:05.096" v="89" actId="478"/>
-          <ac:cxnSpMkLst>
-            <pc:docMk/>
-            <pc:sldMk cId="1224849072" sldId="260"/>
-            <ac:cxnSpMk id="46" creationId="{07B8F779-05E2-A6DD-F0AA-138AF3DA78FC}"/>
-          </ac:cxnSpMkLst>
-        </pc:cxnChg>
-        <pc:cxnChg chg="del mod">
-          <ac:chgData name="Castiello de Obeso, Santiago" userId="b4fc0b8e-1f0e-417a-8aad-015961d2398a" providerId="ADAL" clId="{AE23CADE-1E1E-4A42-BA53-D7F25A2D2BFC}" dt="2025-07-21T14:23:05.096" v="89" actId="478"/>
-          <ac:cxnSpMkLst>
-            <pc:docMk/>
-            <pc:sldMk cId="1224849072" sldId="260"/>
-            <ac:cxnSpMk id="47" creationId="{5DA7E969-BAC0-BEAB-2360-2EFCE8BEFF0B}"/>
-          </ac:cxnSpMkLst>
-        </pc:cxnChg>
-        <pc:cxnChg chg="mod">
-          <ac:chgData name="Castiello de Obeso, Santiago" userId="b4fc0b8e-1f0e-417a-8aad-015961d2398a" providerId="ADAL" clId="{AE23CADE-1E1E-4A42-BA53-D7F25A2D2BFC}" dt="2025-07-21T14:23:34.622" v="174" actId="1076"/>
-          <ac:cxnSpMkLst>
-            <pc:docMk/>
-            <pc:sldMk cId="1224849072" sldId="260"/>
-            <ac:cxnSpMk id="48" creationId="{CE0386C7-7E1D-B462-9E15-8BB599D981E9}"/>
-          </ac:cxnSpMkLst>
-        </pc:cxnChg>
-        <pc:cxnChg chg="mod">
-          <ac:chgData name="Castiello de Obeso, Santiago" userId="b4fc0b8e-1f0e-417a-8aad-015961d2398a" providerId="ADAL" clId="{AE23CADE-1E1E-4A42-BA53-D7F25A2D2BFC}" dt="2025-07-21T14:24:05.038" v="206" actId="1037"/>
-          <ac:cxnSpMkLst>
-            <pc:docMk/>
-            <pc:sldMk cId="1224849072" sldId="260"/>
-            <ac:cxnSpMk id="50" creationId="{617BC47A-14E2-47FC-BB85-0A6B10EEC3D7}"/>
-          </ac:cxnSpMkLst>
-        </pc:cxnChg>
-        <pc:cxnChg chg="add mod">
-          <ac:chgData name="Castiello de Obeso, Santiago" userId="b4fc0b8e-1f0e-417a-8aad-015961d2398a" providerId="ADAL" clId="{AE23CADE-1E1E-4A42-BA53-D7F25A2D2BFC}" dt="2025-07-21T14:23:34.622" v="174" actId="1076"/>
-          <ac:cxnSpMkLst>
-            <pc:docMk/>
-            <pc:sldMk cId="1224849072" sldId="260"/>
-            <ac:cxnSpMk id="54" creationId="{3BB0B1D2-D520-EAB1-BD42-CA0CC3248EDA}"/>
-          </ac:cxnSpMkLst>
-        </pc:cxnChg>
-        <pc:cxnChg chg="mod">
-          <ac:chgData name="Castiello de Obeso, Santiago" userId="b4fc0b8e-1f0e-417a-8aad-015961d2398a" providerId="ADAL" clId="{AE23CADE-1E1E-4A42-BA53-D7F25A2D2BFC}" dt="2025-07-21T14:24:05.038" v="206" actId="1037"/>
-          <ac:cxnSpMkLst>
-            <pc:docMk/>
-            <pc:sldMk cId="1224849072" sldId="260"/>
-            <ac:cxnSpMk id="55" creationId="{AADD3BAA-5291-F77E-D9B4-A23B8CE6CEED}"/>
-          </ac:cxnSpMkLst>
-        </pc:cxnChg>
-        <pc:cxnChg chg="mod">
-          <ac:chgData name="Castiello de Obeso, Santiago" userId="b4fc0b8e-1f0e-417a-8aad-015961d2398a" providerId="ADAL" clId="{AE23CADE-1E1E-4A42-BA53-D7F25A2D2BFC}" dt="2025-07-21T14:23:34.622" v="174" actId="1076"/>
-          <ac:cxnSpMkLst>
-            <pc:docMk/>
-            <pc:sldMk cId="1224849072" sldId="260"/>
-            <ac:cxnSpMk id="58" creationId="{10B9DA49-F469-6B59-6E21-903474AEA24A}"/>
-          </ac:cxnSpMkLst>
-        </pc:cxnChg>
-        <pc:cxnChg chg="mod">
-          <ac:chgData name="Castiello de Obeso, Santiago" userId="b4fc0b8e-1f0e-417a-8aad-015961d2398a" providerId="ADAL" clId="{AE23CADE-1E1E-4A42-BA53-D7F25A2D2BFC}" dt="2025-07-21T14:23:14.009" v="172" actId="1038"/>
-          <ac:cxnSpMkLst>
-            <pc:docMk/>
-            <pc:sldMk cId="1224849072" sldId="260"/>
-            <ac:cxnSpMk id="60" creationId="{D674ABF9-7D43-FCB4-9496-EC643270A621}"/>
-          </ac:cxnSpMkLst>
-        </pc:cxnChg>
-        <pc:cxnChg chg="mod">
-          <ac:chgData name="Castiello de Obeso, Santiago" userId="b4fc0b8e-1f0e-417a-8aad-015961d2398a" providerId="ADAL" clId="{AE23CADE-1E1E-4A42-BA53-D7F25A2D2BFC}" dt="2025-07-21T14:23:14.009" v="172" actId="1038"/>
-          <ac:cxnSpMkLst>
-            <pc:docMk/>
-            <pc:sldMk cId="1224849072" sldId="260"/>
-            <ac:cxnSpMk id="61" creationId="{65CD92FB-2C0C-346C-B7FD-A0124A7460AC}"/>
-          </ac:cxnSpMkLst>
-        </pc:cxnChg>
-        <pc:cxnChg chg="del mod">
-          <ac:chgData name="Castiello de Obeso, Santiago" userId="b4fc0b8e-1f0e-417a-8aad-015961d2398a" providerId="ADAL" clId="{AE23CADE-1E1E-4A42-BA53-D7F25A2D2BFC}" dt="2025-07-21T14:25:24.573" v="227" actId="478"/>
-          <ac:cxnSpMkLst>
-            <pc:docMk/>
-            <pc:sldMk cId="1224849072" sldId="260"/>
-            <ac:cxnSpMk id="87" creationId="{CDFBD5F9-9134-48EE-B988-DF1FE6ACFD4A}"/>
-          </ac:cxnSpMkLst>
-        </pc:cxnChg>
-        <pc:cxnChg chg="del mod">
-          <ac:chgData name="Castiello de Obeso, Santiago" userId="b4fc0b8e-1f0e-417a-8aad-015961d2398a" providerId="ADAL" clId="{AE23CADE-1E1E-4A42-BA53-D7F25A2D2BFC}" dt="2025-07-21T14:25:24.573" v="227" actId="478"/>
-          <ac:cxnSpMkLst>
-            <pc:docMk/>
-            <pc:sldMk cId="1224849072" sldId="260"/>
-            <ac:cxnSpMk id="88" creationId="{05D5EABE-33CE-DFD1-78A6-420CE9FAA8DA}"/>
-          </ac:cxnSpMkLst>
-        </pc:cxnChg>
         <pc:cxnChg chg="mod">
           <ac:chgData name="Castiello de Obeso, Santiago" userId="b4fc0b8e-1f0e-417a-8aad-015961d2398a" providerId="ADAL" clId="{AE23CADE-1E1E-4A42-BA53-D7F25A2D2BFC}" dt="2025-07-22T15:16:15.395" v="511" actId="1076"/>
           <ac:cxnSpMkLst>
@@ -986,30 +498,6 @@
             <pc:docMk/>
             <pc:sldMk cId="1224849072" sldId="260"/>
             <ac:cxnSpMk id="90" creationId="{14583604-B211-B042-999D-4A59EC472123}"/>
-          </ac:cxnSpMkLst>
-        </pc:cxnChg>
-        <pc:cxnChg chg="mod">
-          <ac:chgData name="Castiello de Obeso, Santiago" userId="b4fc0b8e-1f0e-417a-8aad-015961d2398a" providerId="ADAL" clId="{AE23CADE-1E1E-4A42-BA53-D7F25A2D2BFC}" dt="2025-07-21T14:23:14.009" v="172" actId="1038"/>
-          <ac:cxnSpMkLst>
-            <pc:docMk/>
-            <pc:sldMk cId="1224849072" sldId="260"/>
-            <ac:cxnSpMk id="99" creationId="{95A78B9E-A62D-44D6-495C-19CC00420148}"/>
-          </ac:cxnSpMkLst>
-        </pc:cxnChg>
-        <pc:cxnChg chg="mod">
-          <ac:chgData name="Castiello de Obeso, Santiago" userId="b4fc0b8e-1f0e-417a-8aad-015961d2398a" providerId="ADAL" clId="{AE23CADE-1E1E-4A42-BA53-D7F25A2D2BFC}" dt="2025-07-21T14:24:05.038" v="206" actId="1037"/>
-          <ac:cxnSpMkLst>
-            <pc:docMk/>
-            <pc:sldMk cId="1224849072" sldId="260"/>
-            <ac:cxnSpMk id="102" creationId="{1C1305E9-527D-2446-EFC7-2892153C8F11}"/>
-          </ac:cxnSpMkLst>
-        </pc:cxnChg>
-        <pc:cxnChg chg="mod">
-          <ac:chgData name="Castiello de Obeso, Santiago" userId="b4fc0b8e-1f0e-417a-8aad-015961d2398a" providerId="ADAL" clId="{AE23CADE-1E1E-4A42-BA53-D7F25A2D2BFC}" dt="2025-07-21T14:24:05.038" v="206" actId="1037"/>
-          <ac:cxnSpMkLst>
-            <pc:docMk/>
-            <pc:sldMk cId="1224849072" sldId="260"/>
-            <ac:cxnSpMk id="105" creationId="{3D08E03A-A7EB-4FF9-6A7E-F760E0360774}"/>
           </ac:cxnSpMkLst>
         </pc:cxnChg>
         <pc:cxnChg chg="mod">
@@ -1042,54 +530,6 @@
             <pc:docMk/>
             <pc:sldMk cId="1224849072" sldId="260"/>
             <ac:cxnSpMk id="115" creationId="{3C38AEC5-BE1A-005F-9C80-A5F72F2E77F6}"/>
-          </ac:cxnSpMkLst>
-        </pc:cxnChg>
-        <pc:cxnChg chg="del mod">
-          <ac:chgData name="Castiello de Obeso, Santiago" userId="b4fc0b8e-1f0e-417a-8aad-015961d2398a" providerId="ADAL" clId="{AE23CADE-1E1E-4A42-BA53-D7F25A2D2BFC}" dt="2025-07-21T14:27:37.226" v="359" actId="478"/>
-          <ac:cxnSpMkLst>
-            <pc:docMk/>
-            <pc:sldMk cId="1224849072" sldId="260"/>
-            <ac:cxnSpMk id="116" creationId="{E791273A-84DF-C311-F2E6-A06CE2C79808}"/>
-          </ac:cxnSpMkLst>
-        </pc:cxnChg>
-        <pc:cxnChg chg="del mod">
-          <ac:chgData name="Castiello de Obeso, Santiago" userId="b4fc0b8e-1f0e-417a-8aad-015961d2398a" providerId="ADAL" clId="{AE23CADE-1E1E-4A42-BA53-D7F25A2D2BFC}" dt="2025-07-21T14:27:37.226" v="359" actId="478"/>
-          <ac:cxnSpMkLst>
-            <pc:docMk/>
-            <pc:sldMk cId="1224849072" sldId="260"/>
-            <ac:cxnSpMk id="117" creationId="{6E3AFCA4-CBFE-1E8E-76B8-BF686CAEF6D1}"/>
-          </ac:cxnSpMkLst>
-        </pc:cxnChg>
-        <pc:cxnChg chg="del mod">
-          <ac:chgData name="Castiello de Obeso, Santiago" userId="b4fc0b8e-1f0e-417a-8aad-015961d2398a" providerId="ADAL" clId="{AE23CADE-1E1E-4A42-BA53-D7F25A2D2BFC}" dt="2025-07-21T14:27:39.016" v="360" actId="478"/>
-          <ac:cxnSpMkLst>
-            <pc:docMk/>
-            <pc:sldMk cId="1224849072" sldId="260"/>
-            <ac:cxnSpMk id="119" creationId="{6770955B-B853-8AD6-2AB7-E982BCB80907}"/>
-          </ac:cxnSpMkLst>
-        </pc:cxnChg>
-        <pc:cxnChg chg="mod">
-          <ac:chgData name="Castiello de Obeso, Santiago" userId="b4fc0b8e-1f0e-417a-8aad-015961d2398a" providerId="ADAL" clId="{AE23CADE-1E1E-4A42-BA53-D7F25A2D2BFC}" dt="2025-07-21T14:24:05.038" v="206" actId="1037"/>
-          <ac:cxnSpMkLst>
-            <pc:docMk/>
-            <pc:sldMk cId="1224849072" sldId="260"/>
-            <ac:cxnSpMk id="129" creationId="{8578DF50-2AB1-65D1-25F0-F18F9EF4EC10}"/>
-          </ac:cxnSpMkLst>
-        </pc:cxnChg>
-        <pc:cxnChg chg="mod">
-          <ac:chgData name="Castiello de Obeso, Santiago" userId="b4fc0b8e-1f0e-417a-8aad-015961d2398a" providerId="ADAL" clId="{AE23CADE-1E1E-4A42-BA53-D7F25A2D2BFC}" dt="2025-07-21T14:24:05.038" v="206" actId="1037"/>
-          <ac:cxnSpMkLst>
-            <pc:docMk/>
-            <pc:sldMk cId="1224849072" sldId="260"/>
-            <ac:cxnSpMk id="132" creationId="{C17E47FE-AAF1-256F-1147-F4CBC1C39FCC}"/>
-          </ac:cxnSpMkLst>
-        </pc:cxnChg>
-        <pc:cxnChg chg="add mod">
-          <ac:chgData name="Castiello de Obeso, Santiago" userId="b4fc0b8e-1f0e-417a-8aad-015961d2398a" providerId="ADAL" clId="{AE23CADE-1E1E-4A42-BA53-D7F25A2D2BFC}" dt="2025-07-21T14:27:54.166" v="362"/>
-          <ac:cxnSpMkLst>
-            <pc:docMk/>
-            <pc:sldMk cId="1224849072" sldId="260"/>
-            <ac:cxnSpMk id="160" creationId="{991E9882-6712-20C8-541E-0C79157C3ED3}"/>
           </ac:cxnSpMkLst>
         </pc:cxnChg>
         <pc:cxnChg chg="add mod">
@@ -1148,14 +588,6 @@
             <ac:cxnSpMk id="201" creationId="{55940225-A1E1-93BF-EBB3-60E6551FF88D}"/>
           </ac:cxnSpMkLst>
         </pc:cxnChg>
-        <pc:cxnChg chg="add del mod">
-          <ac:chgData name="Castiello de Obeso, Santiago" userId="b4fc0b8e-1f0e-417a-8aad-015961d2398a" providerId="ADAL" clId="{AE23CADE-1E1E-4A42-BA53-D7F25A2D2BFC}" dt="2025-07-22T15:14:32.624" v="467" actId="478"/>
-          <ac:cxnSpMkLst>
-            <pc:docMk/>
-            <pc:sldMk cId="1224849072" sldId="260"/>
-            <ac:cxnSpMk id="206" creationId="{C73F5F90-8772-298C-05EF-FB80CF5BE19A}"/>
-          </ac:cxnSpMkLst>
-        </pc:cxnChg>
         <pc:cxnChg chg="add mod">
           <ac:chgData name="Castiello de Obeso, Santiago" userId="b4fc0b8e-1f0e-417a-8aad-015961d2398a" providerId="ADAL" clId="{AE23CADE-1E1E-4A42-BA53-D7F25A2D2BFC}" dt="2025-07-22T15:14:42.600" v="469" actId="14100"/>
           <ac:cxnSpMkLst>
@@ -1335,7 +767,7 @@
           <a:p>
             <a:fld id="{0AFA125D-6C16-440D-B65A-850231F6884E}" type="datetimeFigureOut">
               <a:rPr lang="en-GB" smtClean="0"/>
-              <a:t>19/07/2025</a:t>
+              <a:t>06/08/2025</a:t>
             </a:fld>
             <a:endParaRPr lang="en-GB"/>
           </a:p>
@@ -1535,7 +967,7 @@
           <a:p>
             <a:fld id="{0AFA125D-6C16-440D-B65A-850231F6884E}" type="datetimeFigureOut">
               <a:rPr lang="en-GB" smtClean="0"/>
-              <a:t>19/07/2025</a:t>
+              <a:t>06/08/2025</a:t>
             </a:fld>
             <a:endParaRPr lang="en-GB"/>
           </a:p>
@@ -1745,7 +1177,7 @@
           <a:p>
             <a:fld id="{0AFA125D-6C16-440D-B65A-850231F6884E}" type="datetimeFigureOut">
               <a:rPr lang="en-GB" smtClean="0"/>
-              <a:t>19/07/2025</a:t>
+              <a:t>06/08/2025</a:t>
             </a:fld>
             <a:endParaRPr lang="en-GB"/>
           </a:p>
@@ -1945,7 +1377,7 @@
           <a:p>
             <a:fld id="{0AFA125D-6C16-440D-B65A-850231F6884E}" type="datetimeFigureOut">
               <a:rPr lang="en-GB" smtClean="0"/>
-              <a:t>19/07/2025</a:t>
+              <a:t>06/08/2025</a:t>
             </a:fld>
             <a:endParaRPr lang="en-GB"/>
           </a:p>
@@ -2221,7 +1653,7 @@
           <a:p>
             <a:fld id="{0AFA125D-6C16-440D-B65A-850231F6884E}" type="datetimeFigureOut">
               <a:rPr lang="en-GB" smtClean="0"/>
-              <a:t>19/07/2025</a:t>
+              <a:t>06/08/2025</a:t>
             </a:fld>
             <a:endParaRPr lang="en-GB"/>
           </a:p>
@@ -2489,7 +1921,7 @@
           <a:p>
             <a:fld id="{0AFA125D-6C16-440D-B65A-850231F6884E}" type="datetimeFigureOut">
               <a:rPr lang="en-GB" smtClean="0"/>
-              <a:t>19/07/2025</a:t>
+              <a:t>06/08/2025</a:t>
             </a:fld>
             <a:endParaRPr lang="en-GB"/>
           </a:p>
@@ -2904,7 +2336,7 @@
           <a:p>
             <a:fld id="{0AFA125D-6C16-440D-B65A-850231F6884E}" type="datetimeFigureOut">
               <a:rPr lang="en-GB" smtClean="0"/>
-              <a:t>19/07/2025</a:t>
+              <a:t>06/08/2025</a:t>
             </a:fld>
             <a:endParaRPr lang="en-GB"/>
           </a:p>
@@ -3046,7 +2478,7 @@
           <a:p>
             <a:fld id="{0AFA125D-6C16-440D-B65A-850231F6884E}" type="datetimeFigureOut">
               <a:rPr lang="en-GB" smtClean="0"/>
-              <a:t>19/07/2025</a:t>
+              <a:t>06/08/2025</a:t>
             </a:fld>
             <a:endParaRPr lang="en-GB"/>
           </a:p>
@@ -3159,7 +2591,7 @@
           <a:p>
             <a:fld id="{0AFA125D-6C16-440D-B65A-850231F6884E}" type="datetimeFigureOut">
               <a:rPr lang="en-GB" smtClean="0"/>
-              <a:t>19/07/2025</a:t>
+              <a:t>06/08/2025</a:t>
             </a:fld>
             <a:endParaRPr lang="en-GB"/>
           </a:p>
@@ -3472,7 +2904,7 @@
           <a:p>
             <a:fld id="{0AFA125D-6C16-440D-B65A-850231F6884E}" type="datetimeFigureOut">
               <a:rPr lang="en-GB" smtClean="0"/>
-              <a:t>19/07/2025</a:t>
+              <a:t>06/08/2025</a:t>
             </a:fld>
             <a:endParaRPr lang="en-GB"/>
           </a:p>
@@ -3761,7 +3193,7 @@
           <a:p>
             <a:fld id="{0AFA125D-6C16-440D-B65A-850231F6884E}" type="datetimeFigureOut">
               <a:rPr lang="en-GB" smtClean="0"/>
-              <a:t>19/07/2025</a:t>
+              <a:t>06/08/2025</a:t>
             </a:fld>
             <a:endParaRPr lang="en-GB"/>
           </a:p>
@@ -4004,7 +3436,7 @@
           <a:p>
             <a:fld id="{0AFA125D-6C16-440D-B65A-850231F6884E}" type="datetimeFigureOut">
               <a:rPr lang="en-GB" smtClean="0"/>
-              <a:t>19/07/2025</a:t>
+              <a:t>06/08/2025</a:t>
             </a:fld>
             <a:endParaRPr lang="en-GB"/>
           </a:p>
@@ -8851,7 +8283,7 @@
                   <a:schemeClr val="tx1"/>
                 </a:solidFill>
               </a:rPr>
-              <a:t>Self</a:t>
+              <a:t>Mirror</a:t>
             </a:r>
           </a:p>
         </p:txBody>
@@ -8905,18 +8337,13 @@
           <a:p>
             <a:pPr algn="ctr"/>
             <a:r>
-              <a:rPr lang="en-GB" sz="1400" dirty="0" err="1">
+              <a:rPr lang="en-GB" sz="1400" dirty="0">
                 <a:solidFill>
                   <a:schemeClr val="tx1"/>
                 </a:solidFill>
               </a:rPr>
-              <a:t>Antiself</a:t>
-            </a:r>
-            <a:endParaRPr lang="en-GB" sz="1400" dirty="0">
-              <a:solidFill>
-                <a:schemeClr val="tx1"/>
-              </a:solidFill>
-            </a:endParaRPr>
+              <a:t>Inverse</a:t>
+            </a:r>
           </a:p>
         </p:txBody>
       </p:sp>
@@ -9087,7 +8514,7 @@
                   <a:schemeClr val="tx1"/>
                 </a:solidFill>
               </a:rPr>
-              <a:t>Self</a:t>
+              <a:t>Mirror</a:t>
             </a:r>
           </a:p>
         </p:txBody>
@@ -9141,18 +8568,13 @@
           <a:p>
             <a:pPr algn="ctr"/>
             <a:r>
-              <a:rPr lang="en-GB" sz="1400" dirty="0" err="1">
+              <a:rPr lang="en-GB" sz="1400" dirty="0">
                 <a:solidFill>
                   <a:schemeClr val="tx1"/>
                 </a:solidFill>
               </a:rPr>
-              <a:t>Antiself</a:t>
-            </a:r>
-            <a:endParaRPr lang="en-GB" sz="1400" dirty="0">
-              <a:solidFill>
-                <a:schemeClr val="tx1"/>
-              </a:solidFill>
-            </a:endParaRPr>
+              <a:t>Inverse</a:t>
+            </a:r>
           </a:p>
         </p:txBody>
       </p:sp>
@@ -9804,7 +9226,7 @@
                   <a:schemeClr val="tx1"/>
                 </a:solidFill>
               </a:rPr>
-              <a:t>Analysis: n = 89</a:t>
+              <a:t>Analysis: n = 97</a:t>
             </a:r>
           </a:p>
         </p:txBody>

</xml_diff>